<commit_message>
Correção do PITCH versão final - Ajuste logo
</commit_message>
<xml_diff>
--- a/PastaDocumentos/PITCH.pptx
+++ b/PastaDocumentos/PITCH.pptx
@@ -3396,10 +3396,10 @@
       </p:sp>
       <p:sp>
         <p:nvSpPr>
-          <p:cNvPr id="4" name="Oval 3">
-            <a:extLst>
-              <a:ext uri="{FF2B5EF4-FFF2-40B4-BE49-F238E27FC236}">
-                <a16:creationId xmlns:a16="http://schemas.microsoft.com/office/drawing/2014/main" id="{93ED8C97-5AA0-421E-BB9D-4A9C457959C3}"/>
+          <p:cNvPr id="4" name="Rectangle 3">
+            <a:extLst>
+              <a:ext uri="{FF2B5EF4-FFF2-40B4-BE49-F238E27FC236}">
+                <a16:creationId xmlns:a16="http://schemas.microsoft.com/office/drawing/2014/main" id="{EEDB6019-D78B-4E8B-874F-B8DA58F35AE8}"/>
               </a:ext>
             </a:extLst>
           </p:cNvPr>
@@ -3408,10 +3408,10 @@
         </p:nvSpPr>
         <p:spPr>
           <a:xfrm>
-            <a:off x="9177867" y="3330222"/>
-            <a:ext cx="2190044" cy="1761067"/>
+            <a:off x="8895644" y="3759200"/>
+            <a:ext cx="2460978" cy="1555044"/>
           </a:xfrm>
-          <a:prstGeom prst="ellipse">
+          <a:prstGeom prst="rect">
             <a:avLst/>
           </a:prstGeom>
         </p:spPr>

</xml_diff>